<commit_message>
Feb 07, FSS finished
</commit_message>
<xml_diff>
--- a/ppt/Universality Class.pptx
+++ b/ppt/Universality Class.pptx
@@ -266,7 +266,7 @@
           <a:p>
             <a:fld id="{45C5E9B6-29D2-4E46-806A-B1748DE28A61}" type="datetimeFigureOut">
               <a:rPr lang="ko-KR" altLang="en-US" smtClean="0"/>
-              <a:t>2022-11-28</a:t>
+              <a:t>2023-02-02</a:t>
             </a:fld>
             <a:endParaRPr lang="ko-KR" altLang="en-US"/>
           </a:p>
@@ -466,7 +466,7 @@
           <a:p>
             <a:fld id="{45C5E9B6-29D2-4E46-806A-B1748DE28A61}" type="datetimeFigureOut">
               <a:rPr lang="ko-KR" altLang="en-US" smtClean="0"/>
-              <a:t>2022-11-28</a:t>
+              <a:t>2023-02-02</a:t>
             </a:fld>
             <a:endParaRPr lang="ko-KR" altLang="en-US"/>
           </a:p>
@@ -676,7 +676,7 @@
           <a:p>
             <a:fld id="{45C5E9B6-29D2-4E46-806A-B1748DE28A61}" type="datetimeFigureOut">
               <a:rPr lang="ko-KR" altLang="en-US" smtClean="0"/>
-              <a:t>2022-11-28</a:t>
+              <a:t>2023-02-02</a:t>
             </a:fld>
             <a:endParaRPr lang="ko-KR" altLang="en-US"/>
           </a:p>
@@ -876,7 +876,7 @@
           <a:p>
             <a:fld id="{45C5E9B6-29D2-4E46-806A-B1748DE28A61}" type="datetimeFigureOut">
               <a:rPr lang="ko-KR" altLang="en-US" smtClean="0"/>
-              <a:t>2022-11-28</a:t>
+              <a:t>2023-02-02</a:t>
             </a:fld>
             <a:endParaRPr lang="ko-KR" altLang="en-US"/>
           </a:p>
@@ -1152,7 +1152,7 @@
           <a:p>
             <a:fld id="{45C5E9B6-29D2-4E46-806A-B1748DE28A61}" type="datetimeFigureOut">
               <a:rPr lang="ko-KR" altLang="en-US" smtClean="0"/>
-              <a:t>2022-11-28</a:t>
+              <a:t>2023-02-02</a:t>
             </a:fld>
             <a:endParaRPr lang="ko-KR" altLang="en-US"/>
           </a:p>
@@ -1420,7 +1420,7 @@
           <a:p>
             <a:fld id="{45C5E9B6-29D2-4E46-806A-B1748DE28A61}" type="datetimeFigureOut">
               <a:rPr lang="ko-KR" altLang="en-US" smtClean="0"/>
-              <a:t>2022-11-28</a:t>
+              <a:t>2023-02-02</a:t>
             </a:fld>
             <a:endParaRPr lang="ko-KR" altLang="en-US"/>
           </a:p>
@@ -1835,7 +1835,7 @@
           <a:p>
             <a:fld id="{45C5E9B6-29D2-4E46-806A-B1748DE28A61}" type="datetimeFigureOut">
               <a:rPr lang="ko-KR" altLang="en-US" smtClean="0"/>
-              <a:t>2022-11-28</a:t>
+              <a:t>2023-02-02</a:t>
             </a:fld>
             <a:endParaRPr lang="ko-KR" altLang="en-US"/>
           </a:p>
@@ -1977,7 +1977,7 @@
           <a:p>
             <a:fld id="{45C5E9B6-29D2-4E46-806A-B1748DE28A61}" type="datetimeFigureOut">
               <a:rPr lang="ko-KR" altLang="en-US" smtClean="0"/>
-              <a:t>2022-11-28</a:t>
+              <a:t>2023-02-02</a:t>
             </a:fld>
             <a:endParaRPr lang="ko-KR" altLang="en-US"/>
           </a:p>
@@ -2090,7 +2090,7 @@
           <a:p>
             <a:fld id="{45C5E9B6-29D2-4E46-806A-B1748DE28A61}" type="datetimeFigureOut">
               <a:rPr lang="ko-KR" altLang="en-US" smtClean="0"/>
-              <a:t>2022-11-28</a:t>
+              <a:t>2023-02-02</a:t>
             </a:fld>
             <a:endParaRPr lang="ko-KR" altLang="en-US"/>
           </a:p>
@@ -2403,7 +2403,7 @@
           <a:p>
             <a:fld id="{45C5E9B6-29D2-4E46-806A-B1748DE28A61}" type="datetimeFigureOut">
               <a:rPr lang="ko-KR" altLang="en-US" smtClean="0"/>
-              <a:t>2022-11-28</a:t>
+              <a:t>2023-02-02</a:t>
             </a:fld>
             <a:endParaRPr lang="ko-KR" altLang="en-US"/>
           </a:p>
@@ -2696,7 +2696,7 @@
           <a:p>
             <a:fld id="{45C5E9B6-29D2-4E46-806A-B1748DE28A61}" type="datetimeFigureOut">
               <a:rPr lang="ko-KR" altLang="en-US" smtClean="0"/>
-              <a:t>2022-11-28</a:t>
+              <a:t>2023-02-02</a:t>
             </a:fld>
             <a:endParaRPr lang="ko-KR" altLang="en-US"/>
           </a:p>
@@ -2939,7 +2939,7 @@
           <a:p>
             <a:fld id="{45C5E9B6-29D2-4E46-806A-B1748DE28A61}" type="datetimeFigureOut">
               <a:rPr lang="ko-KR" altLang="en-US" smtClean="0"/>
-              <a:t>2022-11-28</a:t>
+              <a:t>2023-02-02</a:t>
             </a:fld>
             <a:endParaRPr lang="ko-KR" altLang="en-US"/>
           </a:p>
@@ -6783,7 +6783,15 @@
             <a:pPr algn="ctr"/>
             <a:r>
               <a:rPr lang="en-US" altLang="ko-KR" sz="4800" dirty="0"/>
-              <a:t>Renormalization Group</a:t>
+              <a:t>Coupling</a:t>
+            </a:r>
+            <a:r>
+              <a:rPr lang="ko-KR" altLang="en-US" sz="4800" dirty="0"/>
+              <a:t> </a:t>
+            </a:r>
+            <a:r>
+              <a:rPr lang="en-US" altLang="ko-KR" sz="4800" dirty="0"/>
+              <a:t>Exponents</a:t>
             </a:r>
             <a:endParaRPr lang="ko-KR" altLang="en-US" sz="4800" dirty="0"/>
           </a:p>

</xml_diff>